<commit_message>
atualizar sprint e comunicacao bluetooth
</commit_message>
<xml_diff>
--- a/Sprints/sprint 7.pptx
+++ b/Sprints/sprint 7.pptx
@@ -6,7 +6,8 @@
   </p:sldMasterIdLst>
   <p:sldIdLst>
     <p:sldId id="258" r:id="rId2"/>
-    <p:sldId id="257" r:id="rId3"/>
+    <p:sldId id="259" r:id="rId3"/>
+    <p:sldId id="257" r:id="rId4"/>
   </p:sldIdLst>
   <p:sldSz cx="12192000" cy="6858000"/>
   <p:notesSz cx="6858000" cy="9144000"/>
@@ -3129,6 +3130,122 @@
           <a:p>
             <a:pPr algn="ctr"/>
             <a:r>
+              <a:rPr lang="pt-BR" dirty="0"/>
+              <a:t>Sprint 7</a:t>
+            </a:r>
+          </a:p>
+        </p:txBody>
+      </p:sp>
+      <p:sp>
+        <p:nvSpPr>
+          <p:cNvPr id="3" name="Espaço Reservado para Conteúdo 2"/>
+          <p:cNvSpPr>
+            <a:spLocks noGrp="1"/>
+          </p:cNvSpPr>
+          <p:nvPr>
+            <p:ph idx="1"/>
+          </p:nvPr>
+        </p:nvSpPr>
+        <p:spPr/>
+        <p:txBody>
+          <a:bodyPr/>
+          <a:lstStyle/>
+          <a:p>
+            <a:r>
+              <a:rPr lang="pt-BR" dirty="0" smtClean="0"/>
+              <a:t>Adicionamos os testes de para quando os valores forem maior que o desejado.</a:t>
+            </a:r>
+          </a:p>
+          <a:p>
+            <a:r>
+              <a:rPr lang="pt-BR" dirty="0" smtClean="0"/>
+              <a:t>Realizamos a comunicação com </a:t>
+            </a:r>
+            <a:r>
+              <a:rPr lang="pt-BR" dirty="0" err="1" smtClean="0"/>
+              <a:t>arduino</a:t>
+            </a:r>
+            <a:r>
+              <a:rPr lang="pt-BR" dirty="0" smtClean="0"/>
+              <a:t> </a:t>
+            </a:r>
+            <a:r>
+              <a:rPr lang="pt-BR" dirty="0"/>
+              <a:t>via </a:t>
+            </a:r>
+            <a:r>
+              <a:rPr lang="pt-BR" dirty="0" err="1" smtClean="0"/>
+              <a:t>bluetooth</a:t>
+            </a:r>
+            <a:r>
+              <a:rPr lang="pt-BR" dirty="0" smtClean="0"/>
+              <a:t> com o </a:t>
+            </a:r>
+            <a:r>
+              <a:rPr lang="pt-BR" dirty="0" err="1" smtClean="0"/>
+              <a:t>android</a:t>
+            </a:r>
+            <a:r>
+              <a:rPr lang="pt-BR" smtClean="0"/>
+              <a:t>.</a:t>
+            </a:r>
+            <a:endParaRPr lang="pt-BR" dirty="0" smtClean="0"/>
+          </a:p>
+          <a:p>
+            <a:pPr marL="0" indent="0">
+              <a:buNone/>
+            </a:pPr>
+            <a:endParaRPr lang="pt-BR" dirty="0"/>
+          </a:p>
+        </p:txBody>
+      </p:sp>
+    </p:spTree>
+    <p:extLst>
+      <p:ext uri="{BB962C8B-B14F-4D97-AF65-F5344CB8AC3E}">
+        <p14:creationId xmlns:p14="http://schemas.microsoft.com/office/powerpoint/2010/main" val="3355370312"/>
+      </p:ext>
+    </p:extLst>
+  </p:cSld>
+  <p:clrMapOvr>
+    <a:masterClrMapping/>
+  </p:clrMapOvr>
+</p:sld>
+</file>
+
+<file path=ppt/slides/slide3.xml><?xml version="1.0" encoding="utf-8"?>
+<p:sld xmlns:a="http://schemas.openxmlformats.org/drawingml/2006/main" xmlns:r="http://schemas.openxmlformats.org/officeDocument/2006/relationships" xmlns:p="http://schemas.openxmlformats.org/presentationml/2006/main">
+  <p:cSld>
+    <p:spTree>
+      <p:nvGrpSpPr>
+        <p:cNvPr id="1" name=""/>
+        <p:cNvGrpSpPr/>
+        <p:nvPr/>
+      </p:nvGrpSpPr>
+      <p:grpSpPr>
+        <a:xfrm>
+          <a:off x="0" y="0"/>
+          <a:ext cx="0" cy="0"/>
+          <a:chOff x="0" y="0"/>
+          <a:chExt cx="0" cy="0"/>
+        </a:xfrm>
+      </p:grpSpPr>
+      <p:sp>
+        <p:nvSpPr>
+          <p:cNvPr id="2" name="Título 1"/>
+          <p:cNvSpPr>
+            <a:spLocks noGrp="1"/>
+          </p:cNvSpPr>
+          <p:nvPr>
+            <p:ph type="title"/>
+          </p:nvPr>
+        </p:nvSpPr>
+        <p:spPr/>
+        <p:txBody>
+          <a:bodyPr/>
+          <a:lstStyle/>
+          <a:p>
+            <a:pPr algn="ctr"/>
+            <a:r>
               <a:rPr lang="pt-BR" dirty="0" smtClean="0"/>
               <a:t>Próxima Sprint</a:t>
             </a:r>
@@ -3480,7 +3597,7 @@
   <a:extraClrSchemeLst/>
   <a:extLst>
     <a:ext uri="{05A4C25C-085E-4340-85A3-A5531E510DB2}">
-      <thm15:themeFamily xmlns:thm15="http://schemas.microsoft.com/office/thememl/2012/main" xmlns="" name="Office Theme" id="{62F939B6-93AF-4DB8-9C6B-D6C7DFDC589F}" vid="{4A3C46E8-61CC-4603-A589-7422A47A8E4A}"/>
+      <thm15:themeFamily xmlns="" xmlns:thm15="http://schemas.microsoft.com/office/thememl/2012/main" name="Office Theme" id="{62F939B6-93AF-4DB8-9C6B-D6C7DFDC589F}" vid="{4A3C46E8-61CC-4603-A589-7422A47A8E4A}"/>
     </a:ext>
   </a:extLst>
 </a:theme>

</xml_diff>